<commit_message>
Changed the ModeButtons of Timer window to AnimatedButtons. Added the Assets for round animatedButtons.
</commit_message>
<xml_diff>
--- a/HourGlass/Assets/Präsentation3.pptx
+++ b/HourGlass/Assets/Präsentation3.pptx
@@ -197,7 +197,7 @@
           <a:p>
             <a:fld id="{1AA593C3-E430-4D35-AAB3-1ECEFE646914}" type="datetimeFigureOut">
               <a:rPr lang="de-DE" smtClean="0"/>
-              <a:t>07.09.2025</a:t>
+              <a:t>08.09.2025</a:t>
             </a:fld>
             <a:endParaRPr lang="de-DE"/>
           </a:p>
@@ -679,7 +679,7 @@
           <a:p>
             <a:fld id="{883ECEF7-B6E9-49C4-83BF-168FC5D45A15}" type="datetimeFigureOut">
               <a:rPr lang="de-DE" smtClean="0"/>
-              <a:t>07.09.2025</a:t>
+              <a:t>08.09.2025</a:t>
             </a:fld>
             <a:endParaRPr lang="de-DE"/>
           </a:p>
@@ -849,7 +849,7 @@
           <a:p>
             <a:fld id="{883ECEF7-B6E9-49C4-83BF-168FC5D45A15}" type="datetimeFigureOut">
               <a:rPr lang="de-DE" smtClean="0"/>
-              <a:t>07.09.2025</a:t>
+              <a:t>08.09.2025</a:t>
             </a:fld>
             <a:endParaRPr lang="de-DE"/>
           </a:p>
@@ -1029,7 +1029,7 @@
           <a:p>
             <a:fld id="{883ECEF7-B6E9-49C4-83BF-168FC5D45A15}" type="datetimeFigureOut">
               <a:rPr lang="de-DE" smtClean="0"/>
-              <a:t>07.09.2025</a:t>
+              <a:t>08.09.2025</a:t>
             </a:fld>
             <a:endParaRPr lang="de-DE"/>
           </a:p>
@@ -1199,7 +1199,7 @@
           <a:p>
             <a:fld id="{883ECEF7-B6E9-49C4-83BF-168FC5D45A15}" type="datetimeFigureOut">
               <a:rPr lang="de-DE" smtClean="0"/>
-              <a:t>07.09.2025</a:t>
+              <a:t>08.09.2025</a:t>
             </a:fld>
             <a:endParaRPr lang="de-DE"/>
           </a:p>
@@ -1445,7 +1445,7 @@
           <a:p>
             <a:fld id="{883ECEF7-B6E9-49C4-83BF-168FC5D45A15}" type="datetimeFigureOut">
               <a:rPr lang="de-DE" smtClean="0"/>
-              <a:t>07.09.2025</a:t>
+              <a:t>08.09.2025</a:t>
             </a:fld>
             <a:endParaRPr lang="de-DE"/>
           </a:p>
@@ -1677,7 +1677,7 @@
           <a:p>
             <a:fld id="{883ECEF7-B6E9-49C4-83BF-168FC5D45A15}" type="datetimeFigureOut">
               <a:rPr lang="de-DE" smtClean="0"/>
-              <a:t>07.09.2025</a:t>
+              <a:t>08.09.2025</a:t>
             </a:fld>
             <a:endParaRPr lang="de-DE"/>
           </a:p>
@@ -2044,7 +2044,7 @@
           <a:p>
             <a:fld id="{883ECEF7-B6E9-49C4-83BF-168FC5D45A15}" type="datetimeFigureOut">
               <a:rPr lang="de-DE" smtClean="0"/>
-              <a:t>07.09.2025</a:t>
+              <a:t>08.09.2025</a:t>
             </a:fld>
             <a:endParaRPr lang="de-DE"/>
           </a:p>
@@ -2162,7 +2162,7 @@
           <a:p>
             <a:fld id="{883ECEF7-B6E9-49C4-83BF-168FC5D45A15}" type="datetimeFigureOut">
               <a:rPr lang="de-DE" smtClean="0"/>
-              <a:t>07.09.2025</a:t>
+              <a:t>08.09.2025</a:t>
             </a:fld>
             <a:endParaRPr lang="de-DE"/>
           </a:p>
@@ -2257,7 +2257,7 @@
           <a:p>
             <a:fld id="{883ECEF7-B6E9-49C4-83BF-168FC5D45A15}" type="datetimeFigureOut">
               <a:rPr lang="de-DE" smtClean="0"/>
-              <a:t>07.09.2025</a:t>
+              <a:t>08.09.2025</a:t>
             </a:fld>
             <a:endParaRPr lang="de-DE"/>
           </a:p>
@@ -2534,7 +2534,7 @@
           <a:p>
             <a:fld id="{883ECEF7-B6E9-49C4-83BF-168FC5D45A15}" type="datetimeFigureOut">
               <a:rPr lang="de-DE" smtClean="0"/>
-              <a:t>07.09.2025</a:t>
+              <a:t>08.09.2025</a:t>
             </a:fld>
             <a:endParaRPr lang="de-DE"/>
           </a:p>
@@ -2791,7 +2791,7 @@
           <a:p>
             <a:fld id="{883ECEF7-B6E9-49C4-83BF-168FC5D45A15}" type="datetimeFigureOut">
               <a:rPr lang="de-DE" smtClean="0"/>
-              <a:t>07.09.2025</a:t>
+              <a:t>08.09.2025</a:t>
             </a:fld>
             <a:endParaRPr lang="de-DE"/>
           </a:p>
@@ -3004,7 +3004,7 @@
           <a:p>
             <a:fld id="{883ECEF7-B6E9-49C4-83BF-168FC5D45A15}" type="datetimeFigureOut">
               <a:rPr lang="de-DE" smtClean="0"/>
-              <a:t>07.09.2025</a:t>
+              <a:t>08.09.2025</a:t>
             </a:fld>
             <a:endParaRPr lang="de-DE"/>
           </a:p>
@@ -20020,163 +20020,6 @@
           </a:p>
         </p:txBody>
       </p:sp>
-      <p:sp>
-        <p:nvSpPr>
-          <p:cNvPr id="2" name="Ellipse 1">
-            <a:extLst>
-              <a:ext uri="{FF2B5EF4-FFF2-40B4-BE49-F238E27FC236}">
-                <a16:creationId xmlns:a16="http://schemas.microsoft.com/office/drawing/2014/main" id="{34CB0A75-BC89-4936-A3EB-003F521C2138}"/>
-              </a:ext>
-            </a:extLst>
-          </p:cNvPr>
-          <p:cNvSpPr/>
-          <p:nvPr/>
-        </p:nvSpPr>
-        <p:spPr>
-          <a:xfrm>
-            <a:off x="11513830" y="3232436"/>
-            <a:ext cx="558834" cy="545143"/>
-          </a:xfrm>
-          <a:prstGeom prst="ellipse">
-            <a:avLst/>
-          </a:prstGeom>
-          <a:solidFill>
-            <a:schemeClr val="tx1">
-              <a:lumMod val="50000"/>
-              <a:lumOff val="50000"/>
-            </a:schemeClr>
-          </a:solidFill>
-          <a:ln w="38100"/>
-        </p:spPr>
-        <p:style>
-          <a:lnRef idx="2">
-            <a:schemeClr val="accent1">
-              <a:shade val="15000"/>
-            </a:schemeClr>
-          </a:lnRef>
-          <a:fillRef idx="1">
-            <a:schemeClr val="accent1"/>
-          </a:fillRef>
-          <a:effectRef idx="0">
-            <a:schemeClr val="accent1"/>
-          </a:effectRef>
-          <a:fontRef idx="minor">
-            <a:schemeClr val="lt1"/>
-          </a:fontRef>
-        </p:style>
-        <p:txBody>
-          <a:bodyPr rtlCol="0" anchor="ctr"/>
-          <a:lstStyle/>
-          <a:p>
-            <a:pPr algn="ctr"/>
-            <a:endParaRPr lang="de-DE" sz="1890"/>
-          </a:p>
-        </p:txBody>
-      </p:sp>
-      <p:sp>
-        <p:nvSpPr>
-          <p:cNvPr id="6" name="Ellipse 5">
-            <a:extLst>
-              <a:ext uri="{FF2B5EF4-FFF2-40B4-BE49-F238E27FC236}">
-                <a16:creationId xmlns:a16="http://schemas.microsoft.com/office/drawing/2014/main" id="{B47E2BBE-7C9D-53D9-474C-C4BF26FDA94E}"/>
-              </a:ext>
-            </a:extLst>
-          </p:cNvPr>
-          <p:cNvSpPr/>
-          <p:nvPr/>
-        </p:nvSpPr>
-        <p:spPr>
-          <a:xfrm>
-            <a:off x="11513830" y="4160972"/>
-            <a:ext cx="558834" cy="545143"/>
-          </a:xfrm>
-          <a:prstGeom prst="ellipse">
-            <a:avLst/>
-          </a:prstGeom>
-          <a:solidFill>
-            <a:schemeClr val="bg2">
-              <a:lumMod val="50000"/>
-            </a:schemeClr>
-          </a:solidFill>
-          <a:ln w="38100"/>
-        </p:spPr>
-        <p:style>
-          <a:lnRef idx="2">
-            <a:schemeClr val="accent1">
-              <a:shade val="15000"/>
-            </a:schemeClr>
-          </a:lnRef>
-          <a:fillRef idx="1">
-            <a:schemeClr val="accent1"/>
-          </a:fillRef>
-          <a:effectRef idx="0">
-            <a:schemeClr val="accent1"/>
-          </a:effectRef>
-          <a:fontRef idx="minor">
-            <a:schemeClr val="lt1"/>
-          </a:fontRef>
-        </p:style>
-        <p:txBody>
-          <a:bodyPr rtlCol="0" anchor="ctr"/>
-          <a:lstStyle/>
-          <a:p>
-            <a:pPr algn="ctr"/>
-            <a:endParaRPr lang="de-DE" sz="1890" dirty="0"/>
-          </a:p>
-        </p:txBody>
-      </p:sp>
-      <p:sp>
-        <p:nvSpPr>
-          <p:cNvPr id="7" name="Ellipse 6">
-            <a:extLst>
-              <a:ext uri="{FF2B5EF4-FFF2-40B4-BE49-F238E27FC236}">
-                <a16:creationId xmlns:a16="http://schemas.microsoft.com/office/drawing/2014/main" id="{ABD46845-0BF7-80B5-39F7-E567CCB556EC}"/>
-              </a:ext>
-            </a:extLst>
-          </p:cNvPr>
-          <p:cNvSpPr/>
-          <p:nvPr/>
-        </p:nvSpPr>
-        <p:spPr>
-          <a:xfrm>
-            <a:off x="11513830" y="5110532"/>
-            <a:ext cx="558834" cy="545143"/>
-          </a:xfrm>
-          <a:prstGeom prst="ellipse">
-            <a:avLst/>
-          </a:prstGeom>
-          <a:solidFill>
-            <a:schemeClr val="bg2">
-              <a:lumMod val="50000"/>
-            </a:schemeClr>
-          </a:solidFill>
-          <a:ln w="38100"/>
-        </p:spPr>
-        <p:style>
-          <a:lnRef idx="2">
-            <a:schemeClr val="accent1">
-              <a:shade val="15000"/>
-            </a:schemeClr>
-          </a:lnRef>
-          <a:fillRef idx="1">
-            <a:schemeClr val="accent1"/>
-          </a:fillRef>
-          <a:effectRef idx="0">
-            <a:schemeClr val="accent1"/>
-          </a:effectRef>
-          <a:fontRef idx="minor">
-            <a:schemeClr val="lt1"/>
-          </a:fontRef>
-        </p:style>
-        <p:txBody>
-          <a:bodyPr rtlCol="0" anchor="ctr"/>
-          <a:lstStyle/>
-          <a:p>
-            <a:pPr algn="ctr"/>
-            <a:endParaRPr lang="de-DE" sz="1890" dirty="0"/>
-          </a:p>
-        </p:txBody>
-      </p:sp>
     </p:spTree>
     <p:extLst>
       <p:ext uri="{BB962C8B-B14F-4D97-AF65-F5344CB8AC3E}">

</xml_diff>